<commit_message>
Edited photo => now goats
</commit_message>
<xml_diff>
--- a/Horosgoat.pptx
+++ b/Horosgoat.pptx
@@ -2,17 +2,17 @@
 <file path=ppt/presentation.xml><?xml version="1.0" encoding="utf-8"?>
 <p:presentation xmlns:a="http://schemas.openxmlformats.org/drawingml/2006/main" xmlns:r="http://schemas.openxmlformats.org/officeDocument/2006/relationships" xmlns:p="http://schemas.openxmlformats.org/presentationml/2006/main">
   <p:sldMasterIdLst>
-    <p:sldMasterId id="2147483648" r:id="rId5"/>
+    <p:sldMasterId id="2147483648" r:id="rId1"/>
   </p:sldMasterIdLst>
   <p:notesMasterIdLst>
     <p:notesMasterId r:id="rId7"/>
   </p:notesMasterIdLst>
   <p:sldIdLst>
-    <p:sldId id="256" r:id="rId8"/>
-    <p:sldId id="257" r:id="rId9"/>
-    <p:sldId id="258" r:id="rId10"/>
-    <p:sldId id="259" r:id="rId11"/>
-    <p:sldId id="260" r:id="rId12"/>
+    <p:sldId id="256" r:id="rId2"/>
+    <p:sldId id="257" r:id="rId3"/>
+    <p:sldId id="258" r:id="rId4"/>
+    <p:sldId id="259" r:id="rId5"/>
+    <p:sldId id="260" r:id="rId6"/>
   </p:sldIdLst>
   <p:sldSz cx="13004800" cy="9753600"/>
   <p:notesSz cx="6858000" cy="9144000"/>
@@ -93,13 +93,14 @@
 </p:presentation>
 </file>
 
-<file path=ppt/commentAuthors.xml><?xml version="1.0" encoding="utf-8"?>
-<p:cmAuthorLst xmlns:a="http://schemas.openxmlformats.org/drawingml/2006/main" xmlns:r="http://schemas.openxmlformats.org/officeDocument/2006/relationships" xmlns:p="http://schemas.openxmlformats.org/presentationml/2006/main"/>
-</file>
-
 <file path=ppt/notesMasters/notesMaster1.xml><?xml version="1.0" encoding="utf-8"?>
 <p:notesMaster xmlns:a="http://schemas.openxmlformats.org/drawingml/2006/main" xmlns:r="http://schemas.openxmlformats.org/officeDocument/2006/relationships" xmlns:p="http://schemas.openxmlformats.org/presentationml/2006/main">
   <p:cSld>
+    <p:bg>
+      <p:bgRef idx="1001">
+        <a:schemeClr val="bg1"/>
+      </p:bgRef>
+    </p:bg>
     <p:spTree>
       <p:nvGrpSpPr>
         <p:cNvPr id="1" name=""/>
@@ -117,7 +118,9 @@
       <p:sp>
         <p:nvSpPr>
           <p:cNvPr id="29" name="Shape 29"/>
-          <p:cNvSpPr/>
+          <p:cNvSpPr>
+            <a:spLocks noGrp="1" noRot="1" noChangeAspect="1"/>
+          </p:cNvSpPr>
           <p:nvPr>
             <p:ph type="sldImg"/>
           </p:nvPr>
@@ -136,13 +139,16 @@
           <a:lstStyle/>
           <a:p>
             <a:pPr lvl="0"/>
+            <a:endParaRPr/>
           </a:p>
         </p:txBody>
       </p:sp>
       <p:sp>
         <p:nvSpPr>
           <p:cNvPr id="30" name="Shape 30"/>
-          <p:cNvSpPr/>
+          <p:cNvSpPr>
+            <a:spLocks noGrp="1"/>
+          </p:cNvSpPr>
           <p:nvPr>
             <p:ph type="body" sz="quarter" idx="1"/>
           </p:nvPr>
@@ -161,10 +167,16 @@
           <a:lstStyle/>
           <a:p>
             <a:pPr lvl="0"/>
+            <a:endParaRPr/>
           </a:p>
         </p:txBody>
       </p:sp>
     </p:spTree>
+    <p:extLst>
+      <p:ext uri="{BB962C8B-B14F-4D97-AF65-F5344CB8AC3E}">
+        <p14:creationId xmlns:p14="http://schemas.microsoft.com/office/powerpoint/2010/main" val="3324441384"/>
+      </p:ext>
+    </p:extLst>
   </p:cSld>
   <p:clrMap bg1="lt1" tx1="dk1" bg2="lt2" tx2="dk2" accent1="accent1" accent2="accent2" accent3="accent3" accent4="accent4" accent5="accent5" accent6="accent6" hlink="hlink" folHlink="folHlink"/>
   <p:notesStyle>
@@ -272,7 +284,7 @@
 </file>
 
 <file path=ppt/slideLayouts/slideLayout1.xml><?xml version="1.0" encoding="utf-8"?>
-<p:sldLayout xmlns:a="http://schemas.openxmlformats.org/drawingml/2006/main" xmlns:r="http://schemas.openxmlformats.org/officeDocument/2006/relationships" xmlns:p="http://schemas.openxmlformats.org/presentationml/2006/main" type="tx" showMasterSp="1" showMasterPhAnim="1">
+<p:sldLayout xmlns:a="http://schemas.openxmlformats.org/drawingml/2006/main" xmlns:r="http://schemas.openxmlformats.org/officeDocument/2006/relationships" xmlns:p="http://schemas.openxmlformats.org/presentationml/2006/main" type="tx">
   <p:cSld name="Title &amp; Subtitle">
     <p:spTree>
       <p:nvGrpSpPr>
@@ -291,7 +303,9 @@
       <p:sp>
         <p:nvSpPr>
           <p:cNvPr id="5" name="Shape 5"/>
-          <p:cNvSpPr/>
+          <p:cNvSpPr>
+            <a:spLocks noGrp="1"/>
+          </p:cNvSpPr>
           <p:nvPr>
             <p:ph type="title"/>
           </p:nvPr>
@@ -322,7 +336,9 @@
       <p:sp>
         <p:nvSpPr>
           <p:cNvPr id="6" name="Shape 6"/>
-          <p:cNvSpPr/>
+          <p:cNvSpPr>
+            <a:spLocks noGrp="1"/>
+          </p:cNvSpPr>
           <p:nvPr>
             <p:ph type="body" idx="1"/>
           </p:nvPr>
@@ -388,7 +404,6 @@
               <a:rPr sz="3200"/>
               <a:t>Body Level One</a:t>
             </a:r>
-            <a:endParaRPr sz="3200"/>
           </a:p>
           <a:p>
             <a:pPr lvl="1">
@@ -398,7 +413,6 @@
               <a:rPr sz="3200"/>
               <a:t>Body Level Two</a:t>
             </a:r>
-            <a:endParaRPr sz="3200"/>
           </a:p>
           <a:p>
             <a:pPr lvl="2">
@@ -408,7 +422,6 @@
               <a:rPr sz="3200"/>
               <a:t>Body Level Three</a:t>
             </a:r>
-            <a:endParaRPr sz="3200"/>
           </a:p>
           <a:p>
             <a:pPr lvl="3">
@@ -418,7 +431,6 @@
               <a:rPr sz="3200"/>
               <a:t>Body Level Four</a:t>
             </a:r>
-            <a:endParaRPr sz="3200"/>
           </a:p>
           <a:p>
             <a:pPr lvl="4">
@@ -436,12 +448,12 @@
   <p:clrMapOvr>
     <a:masterClrMapping/>
   </p:clrMapOvr>
-  <p:transition spd="med" advClick="1"/>
+  <p:transition spd="med"/>
 </p:sldLayout>
 </file>
 
 <file path=ppt/slideLayouts/slideLayout10.xml><?xml version="1.0" encoding="utf-8"?>
-<p:sldLayout xmlns:a="http://schemas.openxmlformats.org/drawingml/2006/main" xmlns:r="http://schemas.openxmlformats.org/officeDocument/2006/relationships" xmlns:p="http://schemas.openxmlformats.org/presentationml/2006/main" type="tx" showMasterSp="1" showMasterPhAnim="1">
+<p:sldLayout xmlns:a="http://schemas.openxmlformats.org/drawingml/2006/main" xmlns:r="http://schemas.openxmlformats.org/officeDocument/2006/relationships" xmlns:p="http://schemas.openxmlformats.org/presentationml/2006/main" type="tx">
   <p:cSld name="Quote">
     <p:spTree>
       <p:nvGrpSpPr>
@@ -462,12 +474,12 @@
   <p:clrMapOvr>
     <a:masterClrMapping/>
   </p:clrMapOvr>
-  <p:transition spd="med" advClick="1"/>
+  <p:transition spd="med"/>
 </p:sldLayout>
 </file>
 
 <file path=ppt/slideLayouts/slideLayout11.xml><?xml version="1.0" encoding="utf-8"?>
-<p:sldLayout xmlns:a="http://schemas.openxmlformats.org/drawingml/2006/main" xmlns:r="http://schemas.openxmlformats.org/officeDocument/2006/relationships" xmlns:p="http://schemas.openxmlformats.org/presentationml/2006/main" type="tx" showMasterSp="1" showMasterPhAnim="1">
+<p:sldLayout xmlns:a="http://schemas.openxmlformats.org/drawingml/2006/main" xmlns:r="http://schemas.openxmlformats.org/officeDocument/2006/relationships" xmlns:p="http://schemas.openxmlformats.org/presentationml/2006/main" type="tx">
   <p:cSld name="Photo">
     <p:spTree>
       <p:nvGrpSpPr>
@@ -488,12 +500,12 @@
   <p:clrMapOvr>
     <a:masterClrMapping/>
   </p:clrMapOvr>
-  <p:transition spd="med" advClick="1"/>
+  <p:transition spd="med"/>
 </p:sldLayout>
 </file>
 
 <file path=ppt/slideLayouts/slideLayout12.xml><?xml version="1.0" encoding="utf-8"?>
-<p:sldLayout xmlns:a="http://schemas.openxmlformats.org/drawingml/2006/main" xmlns:r="http://schemas.openxmlformats.org/officeDocument/2006/relationships" xmlns:p="http://schemas.openxmlformats.org/presentationml/2006/main" type="tx" showMasterSp="1" showMasterPhAnim="1">
+<p:sldLayout xmlns:a="http://schemas.openxmlformats.org/drawingml/2006/main" xmlns:r="http://schemas.openxmlformats.org/officeDocument/2006/relationships" xmlns:p="http://schemas.openxmlformats.org/presentationml/2006/main" type="tx">
   <p:cSld name="Blank">
     <p:spTree>
       <p:nvGrpSpPr>
@@ -514,12 +526,12 @@
   <p:clrMapOvr>
     <a:masterClrMapping/>
   </p:clrMapOvr>
-  <p:transition spd="med" advClick="1"/>
+  <p:transition spd="med"/>
 </p:sldLayout>
 </file>
 
 <file path=ppt/slideLayouts/slideLayout2.xml><?xml version="1.0" encoding="utf-8"?>
-<p:sldLayout xmlns:a="http://schemas.openxmlformats.org/drawingml/2006/main" xmlns:r="http://schemas.openxmlformats.org/officeDocument/2006/relationships" xmlns:p="http://schemas.openxmlformats.org/presentationml/2006/main" type="tx" showMasterSp="1" showMasterPhAnim="1">
+<p:sldLayout xmlns:a="http://schemas.openxmlformats.org/drawingml/2006/main" xmlns:r="http://schemas.openxmlformats.org/officeDocument/2006/relationships" xmlns:p="http://schemas.openxmlformats.org/presentationml/2006/main" type="tx">
   <p:cSld name="Photo - Horizontal">
     <p:spTree>
       <p:nvGrpSpPr>
@@ -538,7 +550,9 @@
       <p:sp>
         <p:nvSpPr>
           <p:cNvPr id="8" name="Shape 8"/>
-          <p:cNvSpPr/>
+          <p:cNvSpPr>
+            <a:spLocks noGrp="1"/>
+          </p:cNvSpPr>
           <p:nvPr>
             <p:ph type="title"/>
           </p:nvPr>
@@ -569,7 +583,9 @@
       <p:sp>
         <p:nvSpPr>
           <p:cNvPr id="9" name="Shape 9"/>
-          <p:cNvSpPr/>
+          <p:cNvSpPr>
+            <a:spLocks noGrp="1"/>
+          </p:cNvSpPr>
           <p:nvPr>
             <p:ph type="body" idx="1"/>
           </p:nvPr>
@@ -635,7 +651,6 @@
               <a:rPr sz="3200"/>
               <a:t>Body Level One</a:t>
             </a:r>
-            <a:endParaRPr sz="3200"/>
           </a:p>
           <a:p>
             <a:pPr lvl="1">
@@ -645,7 +660,6 @@
               <a:rPr sz="3200"/>
               <a:t>Body Level Two</a:t>
             </a:r>
-            <a:endParaRPr sz="3200"/>
           </a:p>
           <a:p>
             <a:pPr lvl="2">
@@ -655,7 +669,6 @@
               <a:rPr sz="3200"/>
               <a:t>Body Level Three</a:t>
             </a:r>
-            <a:endParaRPr sz="3200"/>
           </a:p>
           <a:p>
             <a:pPr lvl="3">
@@ -665,7 +678,6 @@
               <a:rPr sz="3200"/>
               <a:t>Body Level Four</a:t>
             </a:r>
-            <a:endParaRPr sz="3200"/>
           </a:p>
           <a:p>
             <a:pPr lvl="4">
@@ -683,12 +695,12 @@
   <p:clrMapOvr>
     <a:masterClrMapping/>
   </p:clrMapOvr>
-  <p:transition spd="med" advClick="1"/>
+  <p:transition spd="med"/>
 </p:sldLayout>
 </file>
 
 <file path=ppt/slideLayouts/slideLayout3.xml><?xml version="1.0" encoding="utf-8"?>
-<p:sldLayout xmlns:a="http://schemas.openxmlformats.org/drawingml/2006/main" xmlns:r="http://schemas.openxmlformats.org/officeDocument/2006/relationships" xmlns:p="http://schemas.openxmlformats.org/presentationml/2006/main" type="tx" showMasterSp="1" showMasterPhAnim="1">
+<p:sldLayout xmlns:a="http://schemas.openxmlformats.org/drawingml/2006/main" xmlns:r="http://schemas.openxmlformats.org/officeDocument/2006/relationships" xmlns:p="http://schemas.openxmlformats.org/presentationml/2006/main" type="tx">
   <p:cSld name="Title - Center">
     <p:spTree>
       <p:nvGrpSpPr>
@@ -707,7 +719,9 @@
       <p:sp>
         <p:nvSpPr>
           <p:cNvPr id="11" name="Shape 11"/>
-          <p:cNvSpPr/>
+          <p:cNvSpPr>
+            <a:spLocks noGrp="1"/>
+          </p:cNvSpPr>
           <p:nvPr>
             <p:ph type="title"/>
           </p:nvPr>
@@ -740,12 +754,12 @@
   <p:clrMapOvr>
     <a:masterClrMapping/>
   </p:clrMapOvr>
-  <p:transition spd="med" advClick="1"/>
+  <p:transition spd="med"/>
 </p:sldLayout>
 </file>
 
 <file path=ppt/slideLayouts/slideLayout4.xml><?xml version="1.0" encoding="utf-8"?>
-<p:sldLayout xmlns:a="http://schemas.openxmlformats.org/drawingml/2006/main" xmlns:r="http://schemas.openxmlformats.org/officeDocument/2006/relationships" xmlns:p="http://schemas.openxmlformats.org/presentationml/2006/main" type="tx" showMasterSp="1" showMasterPhAnim="1">
+<p:sldLayout xmlns:a="http://schemas.openxmlformats.org/drawingml/2006/main" xmlns:r="http://schemas.openxmlformats.org/officeDocument/2006/relationships" xmlns:p="http://schemas.openxmlformats.org/presentationml/2006/main" type="tx">
   <p:cSld name="Photo - Vertical">
     <p:spTree>
       <p:nvGrpSpPr>
@@ -764,7 +778,9 @@
       <p:sp>
         <p:nvSpPr>
           <p:cNvPr id="13" name="Shape 13"/>
-          <p:cNvSpPr/>
+          <p:cNvSpPr>
+            <a:spLocks noGrp="1"/>
+          </p:cNvSpPr>
           <p:nvPr>
             <p:ph type="title"/>
           </p:nvPr>
@@ -799,7 +815,9 @@
       <p:sp>
         <p:nvSpPr>
           <p:cNvPr id="14" name="Shape 14"/>
-          <p:cNvSpPr/>
+          <p:cNvSpPr>
+            <a:spLocks noGrp="1"/>
+          </p:cNvSpPr>
           <p:nvPr>
             <p:ph type="body" idx="1"/>
           </p:nvPr>
@@ -865,7 +883,6 @@
               <a:rPr sz="3200"/>
               <a:t>Body Level One</a:t>
             </a:r>
-            <a:endParaRPr sz="3200"/>
           </a:p>
           <a:p>
             <a:pPr lvl="1">
@@ -875,7 +892,6 @@
               <a:rPr sz="3200"/>
               <a:t>Body Level Two</a:t>
             </a:r>
-            <a:endParaRPr sz="3200"/>
           </a:p>
           <a:p>
             <a:pPr lvl="2">
@@ -885,7 +901,6 @@
               <a:rPr sz="3200"/>
               <a:t>Body Level Three</a:t>
             </a:r>
-            <a:endParaRPr sz="3200"/>
           </a:p>
           <a:p>
             <a:pPr lvl="3">
@@ -895,7 +910,6 @@
               <a:rPr sz="3200"/>
               <a:t>Body Level Four</a:t>
             </a:r>
-            <a:endParaRPr sz="3200"/>
           </a:p>
           <a:p>
             <a:pPr lvl="4">
@@ -913,12 +927,12 @@
   <p:clrMapOvr>
     <a:masterClrMapping/>
   </p:clrMapOvr>
-  <p:transition spd="med" advClick="1"/>
+  <p:transition spd="med"/>
 </p:sldLayout>
 </file>
 
 <file path=ppt/slideLayouts/slideLayout5.xml><?xml version="1.0" encoding="utf-8"?>
-<p:sldLayout xmlns:a="http://schemas.openxmlformats.org/drawingml/2006/main" xmlns:r="http://schemas.openxmlformats.org/officeDocument/2006/relationships" xmlns:p="http://schemas.openxmlformats.org/presentationml/2006/main" type="tx" showMasterSp="1" showMasterPhAnim="1">
+<p:sldLayout xmlns:a="http://schemas.openxmlformats.org/drawingml/2006/main" xmlns:r="http://schemas.openxmlformats.org/officeDocument/2006/relationships" xmlns:p="http://schemas.openxmlformats.org/presentationml/2006/main" type="tx">
   <p:cSld name="Title - Top">
     <p:spTree>
       <p:nvGrpSpPr>
@@ -937,7 +951,9 @@
       <p:sp>
         <p:nvSpPr>
           <p:cNvPr id="16" name="Shape 16"/>
-          <p:cNvSpPr/>
+          <p:cNvSpPr>
+            <a:spLocks noGrp="1"/>
+          </p:cNvSpPr>
           <p:nvPr>
             <p:ph type="title"/>
           </p:nvPr>
@@ -966,12 +982,12 @@
   <p:clrMapOvr>
     <a:masterClrMapping/>
   </p:clrMapOvr>
-  <p:transition spd="med" advClick="1"/>
+  <p:transition spd="med"/>
 </p:sldLayout>
 </file>
 
 <file path=ppt/slideLayouts/slideLayout6.xml><?xml version="1.0" encoding="utf-8"?>
-<p:sldLayout xmlns:a="http://schemas.openxmlformats.org/drawingml/2006/main" xmlns:r="http://schemas.openxmlformats.org/officeDocument/2006/relationships" xmlns:p="http://schemas.openxmlformats.org/presentationml/2006/main" type="tx" showMasterSp="1" showMasterPhAnim="1">
+<p:sldLayout xmlns:a="http://schemas.openxmlformats.org/drawingml/2006/main" xmlns:r="http://schemas.openxmlformats.org/officeDocument/2006/relationships" xmlns:p="http://schemas.openxmlformats.org/presentationml/2006/main" type="tx">
   <p:cSld name="Title &amp; Bullets">
     <p:spTree>
       <p:nvGrpSpPr>
@@ -990,7 +1006,9 @@
       <p:sp>
         <p:nvSpPr>
           <p:cNvPr id="18" name="Shape 18"/>
-          <p:cNvSpPr/>
+          <p:cNvSpPr>
+            <a:spLocks noGrp="1"/>
+          </p:cNvSpPr>
           <p:nvPr>
             <p:ph type="title"/>
           </p:nvPr>
@@ -1017,7 +1035,9 @@
       <p:sp>
         <p:nvSpPr>
           <p:cNvPr id="19" name="Shape 19"/>
-          <p:cNvSpPr/>
+          <p:cNvSpPr>
+            <a:spLocks noGrp="1"/>
+          </p:cNvSpPr>
           <p:nvPr>
             <p:ph type="body" idx="1"/>
           </p:nvPr>
@@ -1038,7 +1058,6 @@
               <a:rPr sz="3600"/>
               <a:t>Body Level One</a:t>
             </a:r>
-            <a:endParaRPr sz="3600"/>
           </a:p>
           <a:p>
             <a:pPr lvl="1">
@@ -1048,7 +1067,6 @@
               <a:rPr sz="3600"/>
               <a:t>Body Level Two</a:t>
             </a:r>
-            <a:endParaRPr sz="3600"/>
           </a:p>
           <a:p>
             <a:pPr lvl="2">
@@ -1058,7 +1076,6 @@
               <a:rPr sz="3600"/>
               <a:t>Body Level Three</a:t>
             </a:r>
-            <a:endParaRPr sz="3600"/>
           </a:p>
           <a:p>
             <a:pPr lvl="3">
@@ -1068,7 +1085,6 @@
               <a:rPr sz="3600"/>
               <a:t>Body Level Four</a:t>
             </a:r>
-            <a:endParaRPr sz="3600"/>
           </a:p>
           <a:p>
             <a:pPr lvl="4">
@@ -1086,12 +1102,12 @@
   <p:clrMapOvr>
     <a:masterClrMapping/>
   </p:clrMapOvr>
-  <p:transition spd="med" advClick="1"/>
+  <p:transition spd="med"/>
 </p:sldLayout>
 </file>
 
 <file path=ppt/slideLayouts/slideLayout7.xml><?xml version="1.0" encoding="utf-8"?>
-<p:sldLayout xmlns:a="http://schemas.openxmlformats.org/drawingml/2006/main" xmlns:r="http://schemas.openxmlformats.org/officeDocument/2006/relationships" xmlns:p="http://schemas.openxmlformats.org/presentationml/2006/main" type="tx" showMasterSp="1" showMasterPhAnim="1">
+<p:sldLayout xmlns:a="http://schemas.openxmlformats.org/drawingml/2006/main" xmlns:r="http://schemas.openxmlformats.org/officeDocument/2006/relationships" xmlns:p="http://schemas.openxmlformats.org/presentationml/2006/main" type="tx">
   <p:cSld name="Title, Bullets &amp; Photo">
     <p:spTree>
       <p:nvGrpSpPr>
@@ -1110,7 +1126,9 @@
       <p:sp>
         <p:nvSpPr>
           <p:cNvPr id="21" name="Shape 21"/>
-          <p:cNvSpPr/>
+          <p:cNvSpPr>
+            <a:spLocks noGrp="1"/>
+          </p:cNvSpPr>
           <p:nvPr>
             <p:ph type="title"/>
           </p:nvPr>
@@ -1137,7 +1155,9 @@
       <p:sp>
         <p:nvSpPr>
           <p:cNvPr id="22" name="Shape 22"/>
-          <p:cNvSpPr/>
+          <p:cNvSpPr>
+            <a:spLocks noGrp="1"/>
+          </p:cNvSpPr>
           <p:nvPr>
             <p:ph type="body" idx="1"/>
           </p:nvPr>
@@ -1193,7 +1213,6 @@
               <a:rPr sz="2800"/>
               <a:t>Body Level One</a:t>
             </a:r>
-            <a:endParaRPr sz="2800"/>
           </a:p>
           <a:p>
             <a:pPr lvl="1">
@@ -1203,7 +1222,6 @@
               <a:rPr sz="2800"/>
               <a:t>Body Level Two</a:t>
             </a:r>
-            <a:endParaRPr sz="2800"/>
           </a:p>
           <a:p>
             <a:pPr lvl="2">
@@ -1213,7 +1231,6 @@
               <a:rPr sz="2800"/>
               <a:t>Body Level Three</a:t>
             </a:r>
-            <a:endParaRPr sz="2800"/>
           </a:p>
           <a:p>
             <a:pPr lvl="3">
@@ -1223,7 +1240,6 @@
               <a:rPr sz="2800"/>
               <a:t>Body Level Four</a:t>
             </a:r>
-            <a:endParaRPr sz="2800"/>
           </a:p>
           <a:p>
             <a:pPr lvl="4">
@@ -1241,12 +1257,12 @@
   <p:clrMapOvr>
     <a:masterClrMapping/>
   </p:clrMapOvr>
-  <p:transition spd="med" advClick="1"/>
+  <p:transition spd="med"/>
 </p:sldLayout>
 </file>
 
 <file path=ppt/slideLayouts/slideLayout8.xml><?xml version="1.0" encoding="utf-8"?>
-<p:sldLayout xmlns:a="http://schemas.openxmlformats.org/drawingml/2006/main" xmlns:r="http://schemas.openxmlformats.org/officeDocument/2006/relationships" xmlns:p="http://schemas.openxmlformats.org/presentationml/2006/main" type="tx" showMasterSp="1" showMasterPhAnim="1">
+<p:sldLayout xmlns:a="http://schemas.openxmlformats.org/drawingml/2006/main" xmlns:r="http://schemas.openxmlformats.org/officeDocument/2006/relationships" xmlns:p="http://schemas.openxmlformats.org/presentationml/2006/main" type="tx">
   <p:cSld name="Bullets">
     <p:spTree>
       <p:nvGrpSpPr>
@@ -1265,7 +1281,9 @@
       <p:sp>
         <p:nvSpPr>
           <p:cNvPr id="24" name="Shape 24"/>
-          <p:cNvSpPr/>
+          <p:cNvSpPr>
+            <a:spLocks noGrp="1"/>
+          </p:cNvSpPr>
           <p:nvPr>
             <p:ph type="body" idx="1"/>
           </p:nvPr>
@@ -1290,7 +1308,6 @@
               <a:rPr sz="3600"/>
               <a:t>Body Level One</a:t>
             </a:r>
-            <a:endParaRPr sz="3600"/>
           </a:p>
           <a:p>
             <a:pPr lvl="1">
@@ -1300,7 +1317,6 @@
               <a:rPr sz="3600"/>
               <a:t>Body Level Two</a:t>
             </a:r>
-            <a:endParaRPr sz="3600"/>
           </a:p>
           <a:p>
             <a:pPr lvl="2">
@@ -1310,7 +1326,6 @@
               <a:rPr sz="3600"/>
               <a:t>Body Level Three</a:t>
             </a:r>
-            <a:endParaRPr sz="3600"/>
           </a:p>
           <a:p>
             <a:pPr lvl="3">
@@ -1320,7 +1335,6 @@
               <a:rPr sz="3600"/>
               <a:t>Body Level Four</a:t>
             </a:r>
-            <a:endParaRPr sz="3600"/>
           </a:p>
           <a:p>
             <a:pPr lvl="4">
@@ -1338,12 +1352,12 @@
   <p:clrMapOvr>
     <a:masterClrMapping/>
   </p:clrMapOvr>
-  <p:transition spd="med" advClick="1"/>
+  <p:transition spd="med"/>
 </p:sldLayout>
 </file>
 
 <file path=ppt/slideLayouts/slideLayout9.xml><?xml version="1.0" encoding="utf-8"?>
-<p:sldLayout xmlns:a="http://schemas.openxmlformats.org/drawingml/2006/main" xmlns:r="http://schemas.openxmlformats.org/officeDocument/2006/relationships" xmlns:p="http://schemas.openxmlformats.org/presentationml/2006/main" type="tx" showMasterSp="1" showMasterPhAnim="1">
+<p:sldLayout xmlns:a="http://schemas.openxmlformats.org/drawingml/2006/main" xmlns:r="http://schemas.openxmlformats.org/officeDocument/2006/relationships" xmlns:p="http://schemas.openxmlformats.org/presentationml/2006/main" type="tx">
   <p:cSld name="Photo - 3 Up">
     <p:spTree>
       <p:nvGrpSpPr>
@@ -1364,7 +1378,7 @@
   <p:clrMapOvr>
     <a:masterClrMapping/>
   </p:clrMapOvr>
-  <p:transition spd="med" advClick="1"/>
+  <p:transition spd="med"/>
 </p:sldLayout>
 </file>
 
@@ -1376,6 +1390,7 @@
         <a:solidFill>
           <a:srgbClr val="FFFFFF"/>
         </a:solidFill>
+        <a:effectLst/>
       </p:bgPr>
     </p:bg>
     <p:spTree>
@@ -1395,7 +1410,9 @@
       <p:sp>
         <p:nvSpPr>
           <p:cNvPr id="2" name="Shape 2"/>
-          <p:cNvSpPr/>
+          <p:cNvSpPr>
+            <a:spLocks noGrp="1"/>
+          </p:cNvSpPr>
           <p:nvPr>
             <p:ph type="title"/>
           </p:nvPr>
@@ -1413,13 +1430,13 @@
           </a:ln>
           <a:extLst>
             <a:ext uri="{C572A759-6A51-4108-AA02-DFA0A04FC94B}">
-              <ma14:wrappingTextBoxFlag xmlns:ma14="http://schemas.microsoft.com/office/mac/drawingml/2011/main" val="1"/>
+              <ma14:wrappingTextBoxFlag xmlns:ma14="http://schemas.microsoft.com/office/mac/drawingml/2011/main" xmlns="" val="1"/>
             </a:ext>
           </a:extLst>
         </p:spPr>
         <p:txBody>
           <a:bodyPr lIns="0" tIns="0" rIns="0" bIns="0" anchor="ctr">
-            <a:normAutofit fontScale="100000" lnSpcReduction="0"/>
+            <a:normAutofit/>
           </a:bodyPr>
           <a:lstStyle/>
           <a:p>
@@ -1436,7 +1453,9 @@
       <p:sp>
         <p:nvSpPr>
           <p:cNvPr id="3" name="Shape 3"/>
-          <p:cNvSpPr/>
+          <p:cNvSpPr>
+            <a:spLocks noGrp="1"/>
+          </p:cNvSpPr>
           <p:nvPr>
             <p:ph type="body" idx="1"/>
           </p:nvPr>
@@ -1454,13 +1473,13 @@
           </a:ln>
           <a:extLst>
             <a:ext uri="{C572A759-6A51-4108-AA02-DFA0A04FC94B}">
-              <ma14:wrappingTextBoxFlag xmlns:ma14="http://schemas.microsoft.com/office/mac/drawingml/2011/main" val="1"/>
+              <ma14:wrappingTextBoxFlag xmlns:ma14="http://schemas.microsoft.com/office/mac/drawingml/2011/main" xmlns="" val="1"/>
             </a:ext>
           </a:extLst>
         </p:spPr>
         <p:txBody>
           <a:bodyPr lIns="0" tIns="0" rIns="0" bIns="0" anchor="ctr">
-            <a:normAutofit fontScale="100000" lnSpcReduction="0"/>
+            <a:normAutofit/>
           </a:bodyPr>
           <a:lstStyle/>
           <a:p>
@@ -1471,7 +1490,6 @@
               <a:rPr sz="3600"/>
               <a:t>Body Level One</a:t>
             </a:r>
-            <a:endParaRPr sz="3600"/>
           </a:p>
           <a:p>
             <a:pPr lvl="1">
@@ -1481,7 +1499,6 @@
               <a:rPr sz="3600"/>
               <a:t>Body Level Two</a:t>
             </a:r>
-            <a:endParaRPr sz="3600"/>
           </a:p>
           <a:p>
             <a:pPr lvl="2">
@@ -1491,7 +1508,6 @@
               <a:rPr sz="3600"/>
               <a:t>Body Level Three</a:t>
             </a:r>
-            <a:endParaRPr sz="3600"/>
           </a:p>
           <a:p>
             <a:pPr lvl="3">
@@ -1501,7 +1517,6 @@
               <a:rPr sz="3600"/>
               <a:t>Body Level Four</a:t>
             </a:r>
-            <a:endParaRPr sz="3600"/>
           </a:p>
           <a:p>
             <a:pPr lvl="4">
@@ -1518,20 +1533,20 @@
   </p:cSld>
   <p:clrMap bg1="lt1" tx1="dk1" bg2="lt2" tx2="dk2" accent1="accent1" accent2="accent2" accent3="accent3" accent4="accent4" accent5="accent5" accent6="accent6" hlink="hlink" folHlink="folHlink"/>
   <p:sldLayoutIdLst>
-    <p:sldLayoutId id="2147483649" r:id="rId2"/>
-    <p:sldLayoutId id="2147483650" r:id="rId3"/>
-    <p:sldLayoutId id="2147483651" r:id="rId4"/>
-    <p:sldLayoutId id="2147483652" r:id="rId5"/>
-    <p:sldLayoutId id="2147483653" r:id="rId6"/>
-    <p:sldLayoutId id="2147483654" r:id="rId7"/>
-    <p:sldLayoutId id="2147483655" r:id="rId8"/>
-    <p:sldLayoutId id="2147483656" r:id="rId9"/>
-    <p:sldLayoutId id="2147483657" r:id="rId10"/>
-    <p:sldLayoutId id="2147483658" r:id="rId11"/>
-    <p:sldLayoutId id="2147483659" r:id="rId12"/>
-    <p:sldLayoutId id="2147483660" r:id="rId13"/>
+    <p:sldLayoutId id="2147483649" r:id="rId1"/>
+    <p:sldLayoutId id="2147483650" r:id="rId2"/>
+    <p:sldLayoutId id="2147483651" r:id="rId3"/>
+    <p:sldLayoutId id="2147483652" r:id="rId4"/>
+    <p:sldLayoutId id="2147483653" r:id="rId5"/>
+    <p:sldLayoutId id="2147483654" r:id="rId6"/>
+    <p:sldLayoutId id="2147483655" r:id="rId7"/>
+    <p:sldLayoutId id="2147483656" r:id="rId8"/>
+    <p:sldLayoutId id="2147483657" r:id="rId9"/>
+    <p:sldLayoutId id="2147483658" r:id="rId10"/>
+    <p:sldLayoutId id="2147483659" r:id="rId11"/>
+    <p:sldLayoutId id="2147483660" r:id="rId12"/>
   </p:sldLayoutIdLst>
-  <p:transition spd="med" advClick="1"/>
+  <p:transition spd="med"/>
   <p:txStyles>
     <p:titleStyle>
       <a:lvl1pPr algn="ctr" defTabSz="584200">
@@ -1832,7 +1847,7 @@
 </file>
 
 <file path=ppt/slides/slide1.xml><?xml version="1.0" encoding="utf-8"?>
-<p:sld xmlns:a="http://schemas.openxmlformats.org/drawingml/2006/main" xmlns:r="http://schemas.openxmlformats.org/officeDocument/2006/relationships" xmlns:p="http://schemas.openxmlformats.org/presentationml/2006/main" showMasterSp="1" showMasterPhAnim="1">
+<p:sld xmlns:a="http://schemas.openxmlformats.org/drawingml/2006/main" xmlns:r="http://schemas.openxmlformats.org/officeDocument/2006/relationships" xmlns:p="http://schemas.openxmlformats.org/presentationml/2006/main">
   <p:cSld>
     <p:spTree>
       <p:nvGrpSpPr>
@@ -1880,12 +1895,12 @@
   <p:clrMapOvr>
     <a:masterClrMapping/>
   </p:clrMapOvr>
-  <p:transition spd="med" advClick="1"/>
+  <p:transition spd="med"/>
 </p:sld>
 </file>
 
 <file path=ppt/slides/slide2.xml><?xml version="1.0" encoding="utf-8"?>
-<p:sld xmlns:a="http://schemas.openxmlformats.org/drawingml/2006/main" xmlns:r="http://schemas.openxmlformats.org/officeDocument/2006/relationships" xmlns:p="http://schemas.openxmlformats.org/presentationml/2006/main" showMasterSp="1" showMasterPhAnim="1">
+<p:sld xmlns:a="http://schemas.openxmlformats.org/drawingml/2006/main" xmlns:r="http://schemas.openxmlformats.org/officeDocument/2006/relationships" xmlns:p="http://schemas.openxmlformats.org/presentationml/2006/main">
   <p:cSld>
     <p:spTree>
       <p:nvGrpSpPr>
@@ -1904,7 +1919,9 @@
       <p:sp>
         <p:nvSpPr>
           <p:cNvPr id="34" name="Shape 34"/>
-          <p:cNvSpPr/>
+          <p:cNvSpPr>
+            <a:spLocks noGrp="1"/>
+          </p:cNvSpPr>
           <p:nvPr>
             <p:ph type="title"/>
           </p:nvPr>
@@ -1932,12 +1949,21 @@
           </a:lstStyle>
           <a:p>
             <a:pPr lvl="0">
-              <a:defRPr b="0" sz="1800"/>
+              <a:defRPr sz="1800" b="0"/>
             </a:pPr>
             <a:r>
-              <a:rPr b="1" sz="8000"/>
-              <a:t>Horogoat</a:t>
-            </a:r>
+              <a:rPr sz="8000" b="1" dirty="0" err="1" smtClean="0"/>
+              <a:t>Horo</a:t>
+            </a:r>
+            <a:r>
+              <a:rPr lang="nl-BE" sz="8000" b="1" dirty="0" smtClean="0"/>
+              <a:t>s</a:t>
+            </a:r>
+            <a:r>
+              <a:rPr sz="8000" b="1" dirty="0" smtClean="0"/>
+              <a:t>goat</a:t>
+            </a:r>
+            <a:endParaRPr sz="8000" b="1" dirty="0"/>
           </a:p>
         </p:txBody>
       </p:sp>
@@ -1946,12 +1972,12 @@
   <p:clrMapOvr>
     <a:masterClrMapping/>
   </p:clrMapOvr>
-  <p:transition spd="med" advClick="1"/>
+  <p:transition spd="med"/>
 </p:sld>
 </file>
 
 <file path=ppt/slides/slide3.xml><?xml version="1.0" encoding="utf-8"?>
-<p:sld xmlns:a="http://schemas.openxmlformats.org/drawingml/2006/main" xmlns:r="http://schemas.openxmlformats.org/officeDocument/2006/relationships" xmlns:p="http://schemas.openxmlformats.org/presentationml/2006/main" showMasterSp="1" showMasterPhAnim="1">
+<p:sld xmlns:a="http://schemas.openxmlformats.org/drawingml/2006/main" xmlns:r="http://schemas.openxmlformats.org/officeDocument/2006/relationships" xmlns:p="http://schemas.openxmlformats.org/presentationml/2006/main">
   <p:cSld>
     <p:spTree>
       <p:nvGrpSpPr>
@@ -1970,7 +1996,9 @@
       <p:sp>
         <p:nvSpPr>
           <p:cNvPr id="36" name="Shape 36"/>
-          <p:cNvSpPr/>
+          <p:cNvSpPr>
+            <a:spLocks noGrp="1"/>
+          </p:cNvSpPr>
           <p:nvPr>
             <p:ph type="title"/>
           </p:nvPr>
@@ -1985,13 +2013,16 @@
           <a:lstStyle/>
           <a:p>
             <a:pPr lvl="0"/>
+            <a:endParaRPr/>
           </a:p>
         </p:txBody>
       </p:sp>
       <p:sp>
         <p:nvSpPr>
           <p:cNvPr id="37" name="Shape 37"/>
-          <p:cNvSpPr/>
+          <p:cNvSpPr>
+            <a:spLocks noGrp="1"/>
+          </p:cNvSpPr>
           <p:nvPr>
             <p:ph type="body" idx="1"/>
           </p:nvPr>
@@ -2006,6 +2037,7 @@
           <a:lstStyle/>
           <a:p>
             <a:pPr lvl="0"/>
+            <a:endParaRPr/>
           </a:p>
         </p:txBody>
       </p:sp>
@@ -2041,12 +2073,12 @@
   <p:clrMapOvr>
     <a:masterClrMapping/>
   </p:clrMapOvr>
-  <p:transition spd="med" advClick="1"/>
+  <p:transition spd="med"/>
 </p:sld>
 </file>
 
 <file path=ppt/slides/slide4.xml><?xml version="1.0" encoding="utf-8"?>
-<p:sld xmlns:a="http://schemas.openxmlformats.org/drawingml/2006/main" xmlns:r="http://schemas.openxmlformats.org/officeDocument/2006/relationships" xmlns:p="http://schemas.openxmlformats.org/presentationml/2006/main" showMasterSp="1" showMasterPhAnim="1">
+<p:sld xmlns:a="http://schemas.openxmlformats.org/drawingml/2006/main" xmlns:r="http://schemas.openxmlformats.org/officeDocument/2006/relationships" xmlns:p="http://schemas.openxmlformats.org/presentationml/2006/main">
   <p:cSld>
     <p:spTree>
       <p:nvGrpSpPr>
@@ -2065,7 +2097,9 @@
       <p:sp>
         <p:nvSpPr>
           <p:cNvPr id="40" name="Shape 40"/>
-          <p:cNvSpPr/>
+          <p:cNvSpPr>
+            <a:spLocks noGrp="1"/>
+          </p:cNvSpPr>
           <p:nvPr>
             <p:ph type="title"/>
           </p:nvPr>
@@ -2080,13 +2114,16 @@
           <a:lstStyle/>
           <a:p>
             <a:pPr lvl="0"/>
+            <a:endParaRPr/>
           </a:p>
         </p:txBody>
       </p:sp>
       <p:sp>
         <p:nvSpPr>
           <p:cNvPr id="41" name="Shape 41"/>
-          <p:cNvSpPr/>
+          <p:cNvSpPr>
+            <a:spLocks noGrp="1"/>
+          </p:cNvSpPr>
           <p:nvPr>
             <p:ph type="body" idx="1"/>
           </p:nvPr>
@@ -2101,34 +2138,49 @@
           <a:lstStyle/>
           <a:p>
             <a:pPr lvl="0"/>
+            <a:endParaRPr/>
           </a:p>
         </p:txBody>
       </p:sp>
       <p:pic>
         <p:nvPicPr>
-          <p:cNvPr id="42" name="24b9f6850dad9b57003a55b5674fbcf5.jpg"/>
-          <p:cNvPicPr/>
+          <p:cNvPr id="1026" name="Picture 2" descr="http://i.imgur.com/dgNDaQF.jpg"/>
+          <p:cNvPicPr>
+            <a:picLocks noChangeAspect="1" noChangeArrowheads="1"/>
+          </p:cNvPicPr>
           <p:nvPr/>
         </p:nvPicPr>
         <p:blipFill>
           <a:blip r:embed="rId2">
-            <a:extLst/>
+            <a:extLst>
+              <a:ext uri="{28A0092B-C50C-407E-A947-70E740481C1C}">
+                <a14:useLocalDpi xmlns:a14="http://schemas.microsoft.com/office/drawing/2010/main" val="0"/>
+              </a:ext>
+            </a:extLst>
           </a:blip>
+          <a:srcRect/>
           <a:stretch>
             <a:fillRect/>
           </a:stretch>
         </p:blipFill>
-        <p:spPr>
+        <p:spPr bwMode="auto">
           <a:xfrm>
-            <a:off x="-53773" y="-1448796"/>
-            <a:ext cx="13112346" cy="15622424"/>
+            <a:off x="-1117600" y="-12357"/>
+            <a:ext cx="15240000" cy="11430000"/>
           </a:xfrm>
           <a:prstGeom prst="rect">
             <a:avLst/>
           </a:prstGeom>
-          <a:ln w="12700">
-            <a:miter lim="400000"/>
-          </a:ln>
+          <a:noFill/>
+          <a:extLst>
+            <a:ext uri="{909E8E84-426E-40DD-AFC4-6F175D3DCCD1}">
+              <a14:hiddenFill xmlns:a14="http://schemas.microsoft.com/office/drawing/2010/main">
+                <a:solidFill>
+                  <a:srgbClr val="FFFFFF"/>
+                </a:solidFill>
+              </a14:hiddenFill>
+            </a:ext>
+          </a:extLst>
         </p:spPr>
       </p:pic>
     </p:spTree>
@@ -2136,12 +2188,12 @@
   <p:clrMapOvr>
     <a:masterClrMapping/>
   </p:clrMapOvr>
-  <p:transition spd="med" advClick="1"/>
+  <p:transition spd="med"/>
 </p:sld>
 </file>
 
 <file path=ppt/slides/slide5.xml><?xml version="1.0" encoding="utf-8"?>
-<p:sld xmlns:a="http://schemas.openxmlformats.org/drawingml/2006/main" xmlns:r="http://schemas.openxmlformats.org/officeDocument/2006/relationships" xmlns:p="http://schemas.openxmlformats.org/presentationml/2006/main" showMasterSp="1" showMasterPhAnim="1">
+<p:sld xmlns:a="http://schemas.openxmlformats.org/drawingml/2006/main" xmlns:r="http://schemas.openxmlformats.org/officeDocument/2006/relationships" xmlns:p="http://schemas.openxmlformats.org/presentationml/2006/main">
   <p:cSld>
     <p:spTree>
       <p:nvGrpSpPr>
@@ -2160,7 +2212,9 @@
       <p:sp>
         <p:nvSpPr>
           <p:cNvPr id="44" name="Shape 44"/>
-          <p:cNvSpPr/>
+          <p:cNvSpPr>
+            <a:spLocks noGrp="1"/>
+          </p:cNvSpPr>
           <p:nvPr>
             <p:ph type="title"/>
           </p:nvPr>
@@ -2175,13 +2229,16 @@
           <a:lstStyle/>
           <a:p>
             <a:pPr lvl="0"/>
+            <a:endParaRPr/>
           </a:p>
         </p:txBody>
       </p:sp>
       <p:sp>
         <p:nvSpPr>
           <p:cNvPr id="45" name="Shape 45"/>
-          <p:cNvSpPr/>
+          <p:cNvSpPr>
+            <a:spLocks noGrp="1"/>
+          </p:cNvSpPr>
           <p:nvPr>
             <p:ph type="body" idx="1"/>
           </p:nvPr>
@@ -2196,6 +2253,7 @@
           <a:lstStyle/>
           <a:p>
             <a:pPr lvl="0"/>
+            <a:endParaRPr/>
           </a:p>
         </p:txBody>
       </p:sp>
@@ -2249,7 +2307,7 @@
             <a:miter lim="400000"/>
           </a:ln>
           <a:effectLst>
-            <a:outerShdw sx="100000" sy="100000" kx="0" ky="0" algn="b" rotWithShape="0" blurRad="63500" dist="25400" dir="5400000">
+            <a:outerShdw blurRad="63500" dist="25400" dir="5400000" rotWithShape="0">
               <a:srgbClr val="000000">
                 <a:alpha val="50000"/>
               </a:srgbClr>
@@ -2257,7 +2315,7 @@
           </a:effectLst>
           <a:extLst>
             <a:ext uri="{C572A759-6A51-4108-AA02-DFA0A04FC94B}">
-              <ma14:wrappingTextBoxFlag xmlns:ma14="http://schemas.microsoft.com/office/mac/drawingml/2011/main" val="1"/>
+              <ma14:wrappingTextBoxFlag xmlns:ma14="http://schemas.microsoft.com/office/mac/drawingml/2011/main" xmlns="" val="1"/>
             </a:ext>
           </a:extLst>
         </p:spPr>
@@ -2265,7 +2323,7 @@
           <a:bodyPr lIns="0" tIns="0" rIns="0" bIns="0" anchor="ctr"/>
           <a:lstStyle>
             <a:lvl1pPr>
-              <a:defRPr b="1" sz="3200">
+              <a:defRPr sz="3200" b="1">
                 <a:solidFill>
                   <a:srgbClr val="FFFFFF"/>
                 </a:solidFill>
@@ -2278,14 +2336,14 @@
           </a:lstStyle>
           <a:p>
             <a:pPr lvl="0">
-              <a:defRPr b="0" sz="1800">
+              <a:defRPr sz="1800" b="0">
                 <a:solidFill>
                   <a:srgbClr val="000000"/>
                 </a:solidFill>
               </a:defRPr>
             </a:pPr>
             <a:r>
-              <a:rPr b="1" sz="3200">
+              <a:rPr sz="3200" b="1">
                 <a:solidFill>
                   <a:srgbClr val="FFFFFF"/>
                 </a:solidFill>
@@ -2300,12 +2358,12 @@
   <p:clrMapOvr>
     <a:masterClrMapping/>
   </p:clrMapOvr>
-  <p:transition spd="med" advClick="1"/>
+  <p:transition spd="med"/>
 </p:sld>
 </file>
 
 <file path=ppt/theme/theme1.xml><?xml version="1.0" encoding="utf-8"?>
-<a:theme xmlns:a="http://schemas.openxmlformats.org/drawingml/2006/main" xmlns:r="http://schemas.openxmlformats.org/officeDocument/2006/relationships" name="White">
+<a:theme xmlns:a="http://schemas.openxmlformats.org/drawingml/2006/main" name="White">
   <a:themeElements>
     <a:clrScheme name="White">
       <a:dk1>
@@ -2431,7 +2489,7 @@
       <a:effectStyleLst>
         <a:effectStyle>
           <a:effectLst>
-            <a:outerShdw sx="100000" sy="100000" kx="0" ky="0" algn="b" rotWithShape="0" blurRad="38100" dist="25400" dir="5400000">
+            <a:outerShdw blurRad="38100" dist="25400" dir="5400000" rotWithShape="0">
               <a:srgbClr val="000000">
                 <a:alpha val="50000"/>
               </a:srgbClr>
@@ -2440,7 +2498,7 @@
         </a:effectStyle>
         <a:effectStyle>
           <a:effectLst>
-            <a:outerShdw sx="100000" sy="100000" kx="0" ky="0" algn="b" rotWithShape="0" blurRad="50800" dist="12700" dir="0">
+            <a:outerShdw blurRad="50800" dist="12700" rotWithShape="0">
               <a:srgbClr val="000000">
                 <a:alpha val="50000"/>
               </a:srgbClr>
@@ -2449,7 +2507,7 @@
         </a:effectStyle>
         <a:effectStyle>
           <a:effectLst>
-            <a:outerShdw sx="100000" sy="100000" kx="0" ky="0" algn="b" rotWithShape="0" blurRad="38100" dist="25400" dir="5400000">
+            <a:outerShdw blurRad="38100" dist="25400" dir="5400000" rotWithShape="0">
               <a:srgbClr val="000000">
                 <a:alpha val="50000"/>
               </a:srgbClr>
@@ -2513,8 +2571,8 @@
     <a:spDef>
       <a:spPr>
         <a:blipFill rotWithShape="1">
-          <a:blip r:embed="rId1"/>
-          <a:srcRect l="0" t="0" r="0" b="0"/>
+          <a:blip xmlns:r="http://schemas.openxmlformats.org/officeDocument/2006/relationships" r:embed="rId1"/>
+          <a:srcRect/>
           <a:tile tx="0" ty="0" sx="100000" sy="100000" flip="none" algn="tl"/>
         </a:blipFill>
         <a:ln w="12700" cap="flat">
@@ -2522,14 +2580,14 @@
           <a:miter lim="400000"/>
         </a:ln>
         <a:effectLst>
-          <a:outerShdw sx="100000" sy="100000" kx="0" ky="0" algn="b" rotWithShape="0" blurRad="38100" dist="25400" dir="5400000">
+          <a:outerShdw blurRad="38100" dist="25400" dir="5400000" rotWithShape="0">
             <a:srgbClr val="000000">
               <a:alpha val="50000"/>
             </a:srgbClr>
           </a:outerShdw>
         </a:effectLst>
       </a:spPr>
-      <a:bodyPr rot="0" spcFirstLastPara="1" vertOverflow="overflow" horzOverflow="overflow" vert="horz" wrap="square" lIns="50800" tIns="50800" rIns="50800" bIns="50800" numCol="1" spcCol="38100" rtlCol="0" anchor="ctr" upright="0">
+      <a:bodyPr rot="0" spcFirstLastPara="1" vertOverflow="overflow" horzOverflow="overflow" vert="horz" wrap="square" lIns="50800" tIns="50800" rIns="50800" bIns="50800" numCol="1" spcCol="38100" rtlCol="0" anchor="ctr">
         <a:spAutoFit/>
       </a:bodyPr>
       <a:lstStyle>
@@ -2548,7 +2606,7 @@
           <a:buFontTx/>
           <a:buNone/>
           <a:tabLst/>
-          <a:defRPr b="0" baseline="0" cap="none" i="0" spc="0" strike="noStrike" sz="2400" u="none" kumimoji="0" normalizeH="0">
+          <a:defRPr kumimoji="0" sz="2400" b="0" i="0" u="none" strike="noStrike" cap="none" spc="0" normalizeH="0" baseline="0">
             <a:ln>
               <a:noFill/>
             </a:ln>
@@ -2578,7 +2636,7 @@
           <a:buFontTx/>
           <a:buNone/>
           <a:tabLst/>
-          <a:defRPr b="0" baseline="0" cap="none" i="0" spc="0" strike="noStrike" sz="1800" u="none" kumimoji="0" normalizeH="0">
+          <a:defRPr kumimoji="0" sz="1800" b="0" i="0" u="none" strike="noStrike" cap="none" spc="0" normalizeH="0" baseline="0">
             <a:ln>
               <a:noFill/>
             </a:ln>
@@ -2604,7 +2662,7 @@
           <a:buFontTx/>
           <a:buNone/>
           <a:tabLst/>
-          <a:defRPr b="0" baseline="0" cap="none" i="0" spc="0" strike="noStrike" sz="1800" u="none" kumimoji="0" normalizeH="0">
+          <a:defRPr kumimoji="0" sz="1800" b="0" i="0" u="none" strike="noStrike" cap="none" spc="0" normalizeH="0" baseline="0">
             <a:ln>
               <a:noFill/>
             </a:ln>
@@ -2630,7 +2688,7 @@
           <a:buFontTx/>
           <a:buNone/>
           <a:tabLst/>
-          <a:defRPr b="0" baseline="0" cap="none" i="0" spc="0" strike="noStrike" sz="1800" u="none" kumimoji="0" normalizeH="0">
+          <a:defRPr kumimoji="0" sz="1800" b="0" i="0" u="none" strike="noStrike" cap="none" spc="0" normalizeH="0" baseline="0">
             <a:ln>
               <a:noFill/>
             </a:ln>
@@ -2656,7 +2714,7 @@
           <a:buFontTx/>
           <a:buNone/>
           <a:tabLst/>
-          <a:defRPr b="0" baseline="0" cap="none" i="0" spc="0" strike="noStrike" sz="1800" u="none" kumimoji="0" normalizeH="0">
+          <a:defRPr kumimoji="0" sz="1800" b="0" i="0" u="none" strike="noStrike" cap="none" spc="0" normalizeH="0" baseline="0">
             <a:ln>
               <a:noFill/>
             </a:ln>
@@ -2682,7 +2740,7 @@
           <a:buFontTx/>
           <a:buNone/>
           <a:tabLst/>
-          <a:defRPr b="0" baseline="0" cap="none" i="0" spc="0" strike="noStrike" sz="1800" u="none" kumimoji="0" normalizeH="0">
+          <a:defRPr kumimoji="0" sz="1800" b="0" i="0" u="none" strike="noStrike" cap="none" spc="0" normalizeH="0" baseline="0">
             <a:ln>
               <a:noFill/>
             </a:ln>
@@ -2708,7 +2766,7 @@
           <a:buFontTx/>
           <a:buNone/>
           <a:tabLst/>
-          <a:defRPr b="0" baseline="0" cap="none" i="0" spc="0" strike="noStrike" sz="1800" u="none" kumimoji="0" normalizeH="0">
+          <a:defRPr kumimoji="0" sz="1800" b="0" i="0" u="none" strike="noStrike" cap="none" spc="0" normalizeH="0" baseline="0">
             <a:ln>
               <a:noFill/>
             </a:ln>
@@ -2734,7 +2792,7 @@
           <a:buFontTx/>
           <a:buNone/>
           <a:tabLst/>
-          <a:defRPr b="0" baseline="0" cap="none" i="0" spc="0" strike="noStrike" sz="1800" u="none" kumimoji="0" normalizeH="0">
+          <a:defRPr kumimoji="0" sz="1800" b="0" i="0" u="none" strike="noStrike" cap="none" spc="0" normalizeH="0" baseline="0">
             <a:ln>
               <a:noFill/>
             </a:ln>
@@ -2760,7 +2818,7 @@
           <a:buFontTx/>
           <a:buNone/>
           <a:tabLst/>
-          <a:defRPr b="0" baseline="0" cap="none" i="0" spc="0" strike="noStrike" sz="1800" u="none" kumimoji="0" normalizeH="0">
+          <a:defRPr kumimoji="0" sz="1800" b="0" i="0" u="none" strike="noStrike" cap="none" spc="0" normalizeH="0" baseline="0">
             <a:ln>
               <a:noFill/>
             </a:ln>
@@ -2786,7 +2844,7 @@
           <a:buFontTx/>
           <a:buNone/>
           <a:tabLst/>
-          <a:defRPr b="0" baseline="0" cap="none" i="0" spc="0" strike="noStrike" sz="1800" u="none" kumimoji="0" normalizeH="0">
+          <a:defRPr kumimoji="0" sz="1800" b="0" i="0" u="none" strike="noStrike" cap="none" spc="0" normalizeH="0" baseline="0">
             <a:ln>
               <a:noFill/>
             </a:ln>
@@ -2799,9 +2857,15 @@
         </a:lvl9pPr>
       </a:lstStyle>
       <a:style>
-        <a:lnRef idx="0"/>
-        <a:fillRef idx="0"/>
-        <a:effectRef idx="0"/>
+        <a:lnRef idx="0">
+          <a:scrgbClr r="0" g="0" b="0"/>
+        </a:lnRef>
+        <a:fillRef idx="0">
+          <a:scrgbClr r="0" g="0" b="0"/>
+        </a:fillRef>
+        <a:effectRef idx="0">
+          <a:scrgbClr r="0" g="0" b="0"/>
+        </a:effectRef>
         <a:fontRef idx="none"/>
       </a:style>
     </a:spDef>
@@ -2817,7 +2881,7 @@
         </a:ln>
         <a:effectLst/>
       </a:spPr>
-      <a:bodyPr rot="0" spcFirstLastPara="1" vertOverflow="overflow" horzOverflow="overflow" vert="horz" wrap="square" lIns="91439" tIns="45719" rIns="91439" bIns="45719" numCol="1" spcCol="38100" rtlCol="0" anchor="t" upright="0">
+      <a:bodyPr rot="0" spcFirstLastPara="1" vertOverflow="overflow" horzOverflow="overflow" vert="horz" wrap="square" lIns="91439" tIns="45719" rIns="91439" bIns="45719" numCol="1" spcCol="38100" rtlCol="0" anchor="t">
         <a:noAutofit/>
       </a:bodyPr>
       <a:lstStyle>
@@ -2836,7 +2900,7 @@
           <a:buFontTx/>
           <a:buNone/>
           <a:tabLst/>
-          <a:defRPr b="0" baseline="0" cap="none" i="0" spc="0" strike="noStrike" sz="1800" u="none" kumimoji="0" normalizeH="0">
+          <a:defRPr kumimoji="0" sz="1800" b="0" i="0" u="none" strike="noStrike" cap="none" spc="0" normalizeH="0" baseline="0">
             <a:ln>
               <a:noFill/>
             </a:ln>
@@ -2862,7 +2926,7 @@
           <a:buFontTx/>
           <a:buNone/>
           <a:tabLst/>
-          <a:defRPr b="0" baseline="0" cap="none" i="0" spc="0" strike="noStrike" sz="1800" u="none" kumimoji="0" normalizeH="0">
+          <a:defRPr kumimoji="0" sz="1800" b="0" i="0" u="none" strike="noStrike" cap="none" spc="0" normalizeH="0" baseline="0">
             <a:ln>
               <a:noFill/>
             </a:ln>
@@ -2888,7 +2952,7 @@
           <a:buFontTx/>
           <a:buNone/>
           <a:tabLst/>
-          <a:defRPr b="0" baseline="0" cap="none" i="0" spc="0" strike="noStrike" sz="1800" u="none" kumimoji="0" normalizeH="0">
+          <a:defRPr kumimoji="0" sz="1800" b="0" i="0" u="none" strike="noStrike" cap="none" spc="0" normalizeH="0" baseline="0">
             <a:ln>
               <a:noFill/>
             </a:ln>
@@ -2914,7 +2978,7 @@
           <a:buFontTx/>
           <a:buNone/>
           <a:tabLst/>
-          <a:defRPr b="0" baseline="0" cap="none" i="0" spc="0" strike="noStrike" sz="1800" u="none" kumimoji="0" normalizeH="0">
+          <a:defRPr kumimoji="0" sz="1800" b="0" i="0" u="none" strike="noStrike" cap="none" spc="0" normalizeH="0" baseline="0">
             <a:ln>
               <a:noFill/>
             </a:ln>
@@ -2940,7 +3004,7 @@
           <a:buFontTx/>
           <a:buNone/>
           <a:tabLst/>
-          <a:defRPr b="0" baseline="0" cap="none" i="0" spc="0" strike="noStrike" sz="1800" u="none" kumimoji="0" normalizeH="0">
+          <a:defRPr kumimoji="0" sz="1800" b="0" i="0" u="none" strike="noStrike" cap="none" spc="0" normalizeH="0" baseline="0">
             <a:ln>
               <a:noFill/>
             </a:ln>
@@ -2966,7 +3030,7 @@
           <a:buFontTx/>
           <a:buNone/>
           <a:tabLst/>
-          <a:defRPr b="0" baseline="0" cap="none" i="0" spc="0" strike="noStrike" sz="1800" u="none" kumimoji="0" normalizeH="0">
+          <a:defRPr kumimoji="0" sz="1800" b="0" i="0" u="none" strike="noStrike" cap="none" spc="0" normalizeH="0" baseline="0">
             <a:ln>
               <a:noFill/>
             </a:ln>
@@ -2992,7 +3056,7 @@
           <a:buFontTx/>
           <a:buNone/>
           <a:tabLst/>
-          <a:defRPr b="0" baseline="0" cap="none" i="0" spc="0" strike="noStrike" sz="1800" u="none" kumimoji="0" normalizeH="0">
+          <a:defRPr kumimoji="0" sz="1800" b="0" i="0" u="none" strike="noStrike" cap="none" spc="0" normalizeH="0" baseline="0">
             <a:ln>
               <a:noFill/>
             </a:ln>
@@ -3018,7 +3082,7 @@
           <a:buFontTx/>
           <a:buNone/>
           <a:tabLst/>
-          <a:defRPr b="0" baseline="0" cap="none" i="0" spc="0" strike="noStrike" sz="1800" u="none" kumimoji="0" normalizeH="0">
+          <a:defRPr kumimoji="0" sz="1800" b="0" i="0" u="none" strike="noStrike" cap="none" spc="0" normalizeH="0" baseline="0">
             <a:ln>
               <a:noFill/>
             </a:ln>
@@ -3044,7 +3108,7 @@
           <a:buFontTx/>
           <a:buNone/>
           <a:tabLst/>
-          <a:defRPr b="0" baseline="0" cap="none" i="0" spc="0" strike="noStrike" sz="1800" u="none" kumimoji="0" normalizeH="0">
+          <a:defRPr kumimoji="0" sz="1800" b="0" i="0" u="none" strike="noStrike" cap="none" spc="0" normalizeH="0" baseline="0">
             <a:ln>
               <a:noFill/>
             </a:ln>
@@ -3070,7 +3134,7 @@
           <a:buFontTx/>
           <a:buNone/>
           <a:tabLst/>
-          <a:defRPr b="0" baseline="0" cap="none" i="0" spc="0" strike="noStrike" sz="1800" u="none" kumimoji="0" normalizeH="0">
+          <a:defRPr kumimoji="0" sz="1800" b="0" i="0" u="none" strike="noStrike" cap="none" spc="0" normalizeH="0" baseline="0">
             <a:ln>
               <a:noFill/>
             </a:ln>
@@ -3083,9 +3147,15 @@
         </a:lvl9pPr>
       </a:lstStyle>
       <a:style>
-        <a:lnRef idx="0"/>
-        <a:fillRef idx="0"/>
-        <a:effectRef idx="0"/>
+        <a:lnRef idx="0">
+          <a:scrgbClr r="0" g="0" b="0"/>
+        </a:lnRef>
+        <a:fillRef idx="0">
+          <a:scrgbClr r="0" g="0" b="0"/>
+        </a:fillRef>
+        <a:effectRef idx="0">
+          <a:scrgbClr r="0" g="0" b="0"/>
+        </a:effectRef>
         <a:fontRef idx="none"/>
       </a:style>
     </a:lnDef>
@@ -3098,7 +3168,7 @@
         </a:ln>
         <a:effectLst/>
       </a:spPr>
-      <a:bodyPr rot="0" spcFirstLastPara="1" vertOverflow="overflow" horzOverflow="overflow" vert="horz" wrap="square" lIns="50800" tIns="50800" rIns="50800" bIns="50800" numCol="1" spcCol="38100" rtlCol="0" anchor="ctr" upright="0">
+      <a:bodyPr rot="0" spcFirstLastPara="1" vertOverflow="overflow" horzOverflow="overflow" vert="horz" wrap="square" lIns="50800" tIns="50800" rIns="50800" bIns="50800" numCol="1" spcCol="38100" rtlCol="0" anchor="ctr">
         <a:spAutoFit/>
       </a:bodyPr>
       <a:lstStyle>
@@ -3117,7 +3187,7 @@
           <a:buFontTx/>
           <a:buNone/>
           <a:tabLst/>
-          <a:defRPr b="0" baseline="0" cap="none" i="0" spc="0" strike="noStrike" sz="3600" u="none" kumimoji="0" normalizeH="0">
+          <a:defRPr kumimoji="0" sz="3600" b="0" i="0" u="none" strike="noStrike" cap="none" spc="0" normalizeH="0" baseline="0">
             <a:ln>
               <a:noFill/>
             </a:ln>
@@ -3147,7 +3217,7 @@
           <a:buFontTx/>
           <a:buNone/>
           <a:tabLst/>
-          <a:defRPr b="0" baseline="0" cap="none" i="0" spc="0" strike="noStrike" sz="1800" u="none" kumimoji="0" normalizeH="0">
+          <a:defRPr kumimoji="0" sz="1800" b="0" i="0" u="none" strike="noStrike" cap="none" spc="0" normalizeH="0" baseline="0">
             <a:ln>
               <a:noFill/>
             </a:ln>
@@ -3173,7 +3243,7 @@
           <a:buFontTx/>
           <a:buNone/>
           <a:tabLst/>
-          <a:defRPr b="0" baseline="0" cap="none" i="0" spc="0" strike="noStrike" sz="1800" u="none" kumimoji="0" normalizeH="0">
+          <a:defRPr kumimoji="0" sz="1800" b="0" i="0" u="none" strike="noStrike" cap="none" spc="0" normalizeH="0" baseline="0">
             <a:ln>
               <a:noFill/>
             </a:ln>
@@ -3199,7 +3269,7 @@
           <a:buFontTx/>
           <a:buNone/>
           <a:tabLst/>
-          <a:defRPr b="0" baseline="0" cap="none" i="0" spc="0" strike="noStrike" sz="1800" u="none" kumimoji="0" normalizeH="0">
+          <a:defRPr kumimoji="0" sz="1800" b="0" i="0" u="none" strike="noStrike" cap="none" spc="0" normalizeH="0" baseline="0">
             <a:ln>
               <a:noFill/>
             </a:ln>
@@ -3225,7 +3295,7 @@
           <a:buFontTx/>
           <a:buNone/>
           <a:tabLst/>
-          <a:defRPr b="0" baseline="0" cap="none" i="0" spc="0" strike="noStrike" sz="1800" u="none" kumimoji="0" normalizeH="0">
+          <a:defRPr kumimoji="0" sz="1800" b="0" i="0" u="none" strike="noStrike" cap="none" spc="0" normalizeH="0" baseline="0">
             <a:ln>
               <a:noFill/>
             </a:ln>
@@ -3251,7 +3321,7 @@
           <a:buFontTx/>
           <a:buNone/>
           <a:tabLst/>
-          <a:defRPr b="0" baseline="0" cap="none" i="0" spc="0" strike="noStrike" sz="1800" u="none" kumimoji="0" normalizeH="0">
+          <a:defRPr kumimoji="0" sz="1800" b="0" i="0" u="none" strike="noStrike" cap="none" spc="0" normalizeH="0" baseline="0">
             <a:ln>
               <a:noFill/>
             </a:ln>
@@ -3277,7 +3347,7 @@
           <a:buFontTx/>
           <a:buNone/>
           <a:tabLst/>
-          <a:defRPr b="0" baseline="0" cap="none" i="0" spc="0" strike="noStrike" sz="1800" u="none" kumimoji="0" normalizeH="0">
+          <a:defRPr kumimoji="0" sz="1800" b="0" i="0" u="none" strike="noStrike" cap="none" spc="0" normalizeH="0" baseline="0">
             <a:ln>
               <a:noFill/>
             </a:ln>
@@ -3303,7 +3373,7 @@
           <a:buFontTx/>
           <a:buNone/>
           <a:tabLst/>
-          <a:defRPr b="0" baseline="0" cap="none" i="0" spc="0" strike="noStrike" sz="1800" u="none" kumimoji="0" normalizeH="0">
+          <a:defRPr kumimoji="0" sz="1800" b="0" i="0" u="none" strike="noStrike" cap="none" spc="0" normalizeH="0" baseline="0">
             <a:ln>
               <a:noFill/>
             </a:ln>
@@ -3329,7 +3399,7 @@
           <a:buFontTx/>
           <a:buNone/>
           <a:tabLst/>
-          <a:defRPr b="0" baseline="0" cap="none" i="0" spc="0" strike="noStrike" sz="1800" u="none" kumimoji="0" normalizeH="0">
+          <a:defRPr kumimoji="0" sz="1800" b="0" i="0" u="none" strike="noStrike" cap="none" spc="0" normalizeH="0" baseline="0">
             <a:ln>
               <a:noFill/>
             </a:ln>
@@ -3355,7 +3425,7 @@
           <a:buFontTx/>
           <a:buNone/>
           <a:tabLst/>
-          <a:defRPr b="0" baseline="0" cap="none" i="0" spc="0" strike="noStrike" sz="1800" u="none" kumimoji="0" normalizeH="0">
+          <a:defRPr kumimoji="0" sz="1800" b="0" i="0" u="none" strike="noStrike" cap="none" spc="0" normalizeH="0" baseline="0">
             <a:ln>
               <a:noFill/>
             </a:ln>
@@ -3368,18 +3438,25 @@
         </a:lvl9pPr>
       </a:lstStyle>
       <a:style>
-        <a:lnRef idx="0"/>
-        <a:fillRef idx="0"/>
-        <a:effectRef idx="0"/>
+        <a:lnRef idx="0">
+          <a:scrgbClr r="0" g="0" b="0"/>
+        </a:lnRef>
+        <a:fillRef idx="0">
+          <a:scrgbClr r="0" g="0" b="0"/>
+        </a:fillRef>
+        <a:effectRef idx="0">
+          <a:scrgbClr r="0" g="0" b="0"/>
+        </a:effectRef>
         <a:fontRef idx="none"/>
       </a:style>
     </a:txDef>
   </a:objectDefaults>
+  <a:extraClrSchemeLst/>
 </a:theme>
 </file>
 
 <file path=ppt/theme/theme2.xml><?xml version="1.0" encoding="utf-8"?>
-<a:theme xmlns:a="http://schemas.openxmlformats.org/drawingml/2006/main" xmlns:r="http://schemas.openxmlformats.org/officeDocument/2006/relationships" name="White">
+<a:theme xmlns:a="http://schemas.openxmlformats.org/drawingml/2006/main" name="White">
   <a:themeElements>
     <a:clrScheme name="White">
       <a:dk1>
@@ -3505,7 +3582,7 @@
       <a:effectStyleLst>
         <a:effectStyle>
           <a:effectLst>
-            <a:outerShdw sx="100000" sy="100000" kx="0" ky="0" algn="b" rotWithShape="0" blurRad="38100" dist="25400" dir="5400000">
+            <a:outerShdw blurRad="38100" dist="25400" dir="5400000" rotWithShape="0">
               <a:srgbClr val="000000">
                 <a:alpha val="50000"/>
               </a:srgbClr>
@@ -3514,7 +3591,7 @@
         </a:effectStyle>
         <a:effectStyle>
           <a:effectLst>
-            <a:outerShdw sx="100000" sy="100000" kx="0" ky="0" algn="b" rotWithShape="0" blurRad="50800" dist="12700" dir="0">
+            <a:outerShdw blurRad="50800" dist="12700" rotWithShape="0">
               <a:srgbClr val="000000">
                 <a:alpha val="50000"/>
               </a:srgbClr>
@@ -3523,7 +3600,7 @@
         </a:effectStyle>
         <a:effectStyle>
           <a:effectLst>
-            <a:outerShdw sx="100000" sy="100000" kx="0" ky="0" algn="b" rotWithShape="0" blurRad="38100" dist="25400" dir="5400000">
+            <a:outerShdw blurRad="38100" dist="25400" dir="5400000" rotWithShape="0">
               <a:srgbClr val="000000">
                 <a:alpha val="50000"/>
               </a:srgbClr>
@@ -3587,8 +3664,8 @@
     <a:spDef>
       <a:spPr>
         <a:blipFill rotWithShape="1">
-          <a:blip r:embed="rId1"/>
-          <a:srcRect l="0" t="0" r="0" b="0"/>
+          <a:blip xmlns:r="http://schemas.openxmlformats.org/officeDocument/2006/relationships" r:embed="rId1"/>
+          <a:srcRect/>
           <a:tile tx="0" ty="0" sx="100000" sy="100000" flip="none" algn="tl"/>
         </a:blipFill>
         <a:ln w="12700" cap="flat">
@@ -3596,14 +3673,14 @@
           <a:miter lim="400000"/>
         </a:ln>
         <a:effectLst>
-          <a:outerShdw sx="100000" sy="100000" kx="0" ky="0" algn="b" rotWithShape="0" blurRad="38100" dist="25400" dir="5400000">
+          <a:outerShdw blurRad="38100" dist="25400" dir="5400000" rotWithShape="0">
             <a:srgbClr val="000000">
               <a:alpha val="50000"/>
             </a:srgbClr>
           </a:outerShdw>
         </a:effectLst>
       </a:spPr>
-      <a:bodyPr rot="0" spcFirstLastPara="1" vertOverflow="overflow" horzOverflow="overflow" vert="horz" wrap="square" lIns="50800" tIns="50800" rIns="50800" bIns="50800" numCol="1" spcCol="38100" rtlCol="0" anchor="ctr" upright="0">
+      <a:bodyPr rot="0" spcFirstLastPara="1" vertOverflow="overflow" horzOverflow="overflow" vert="horz" wrap="square" lIns="50800" tIns="50800" rIns="50800" bIns="50800" numCol="1" spcCol="38100" rtlCol="0" anchor="ctr">
         <a:spAutoFit/>
       </a:bodyPr>
       <a:lstStyle>
@@ -3622,7 +3699,7 @@
           <a:buFontTx/>
           <a:buNone/>
           <a:tabLst/>
-          <a:defRPr b="0" baseline="0" cap="none" i="0" spc="0" strike="noStrike" sz="2400" u="none" kumimoji="0" normalizeH="0">
+          <a:defRPr kumimoji="0" sz="2400" b="0" i="0" u="none" strike="noStrike" cap="none" spc="0" normalizeH="0" baseline="0">
             <a:ln>
               <a:noFill/>
             </a:ln>
@@ -3652,7 +3729,7 @@
           <a:buFontTx/>
           <a:buNone/>
           <a:tabLst/>
-          <a:defRPr b="0" baseline="0" cap="none" i="0" spc="0" strike="noStrike" sz="1800" u="none" kumimoji="0" normalizeH="0">
+          <a:defRPr kumimoji="0" sz="1800" b="0" i="0" u="none" strike="noStrike" cap="none" spc="0" normalizeH="0" baseline="0">
             <a:ln>
               <a:noFill/>
             </a:ln>
@@ -3678,7 +3755,7 @@
           <a:buFontTx/>
           <a:buNone/>
           <a:tabLst/>
-          <a:defRPr b="0" baseline="0" cap="none" i="0" spc="0" strike="noStrike" sz="1800" u="none" kumimoji="0" normalizeH="0">
+          <a:defRPr kumimoji="0" sz="1800" b="0" i="0" u="none" strike="noStrike" cap="none" spc="0" normalizeH="0" baseline="0">
             <a:ln>
               <a:noFill/>
             </a:ln>
@@ -3704,7 +3781,7 @@
           <a:buFontTx/>
           <a:buNone/>
           <a:tabLst/>
-          <a:defRPr b="0" baseline="0" cap="none" i="0" spc="0" strike="noStrike" sz="1800" u="none" kumimoji="0" normalizeH="0">
+          <a:defRPr kumimoji="0" sz="1800" b="0" i="0" u="none" strike="noStrike" cap="none" spc="0" normalizeH="0" baseline="0">
             <a:ln>
               <a:noFill/>
             </a:ln>
@@ -3730,7 +3807,7 @@
           <a:buFontTx/>
           <a:buNone/>
           <a:tabLst/>
-          <a:defRPr b="0" baseline="0" cap="none" i="0" spc="0" strike="noStrike" sz="1800" u="none" kumimoji="0" normalizeH="0">
+          <a:defRPr kumimoji="0" sz="1800" b="0" i="0" u="none" strike="noStrike" cap="none" spc="0" normalizeH="0" baseline="0">
             <a:ln>
               <a:noFill/>
             </a:ln>
@@ -3756,7 +3833,7 @@
           <a:buFontTx/>
           <a:buNone/>
           <a:tabLst/>
-          <a:defRPr b="0" baseline="0" cap="none" i="0" spc="0" strike="noStrike" sz="1800" u="none" kumimoji="0" normalizeH="0">
+          <a:defRPr kumimoji="0" sz="1800" b="0" i="0" u="none" strike="noStrike" cap="none" spc="0" normalizeH="0" baseline="0">
             <a:ln>
               <a:noFill/>
             </a:ln>
@@ -3782,7 +3859,7 @@
           <a:buFontTx/>
           <a:buNone/>
           <a:tabLst/>
-          <a:defRPr b="0" baseline="0" cap="none" i="0" spc="0" strike="noStrike" sz="1800" u="none" kumimoji="0" normalizeH="0">
+          <a:defRPr kumimoji="0" sz="1800" b="0" i="0" u="none" strike="noStrike" cap="none" spc="0" normalizeH="0" baseline="0">
             <a:ln>
               <a:noFill/>
             </a:ln>
@@ -3808,7 +3885,7 @@
           <a:buFontTx/>
           <a:buNone/>
           <a:tabLst/>
-          <a:defRPr b="0" baseline="0" cap="none" i="0" spc="0" strike="noStrike" sz="1800" u="none" kumimoji="0" normalizeH="0">
+          <a:defRPr kumimoji="0" sz="1800" b="0" i="0" u="none" strike="noStrike" cap="none" spc="0" normalizeH="0" baseline="0">
             <a:ln>
               <a:noFill/>
             </a:ln>
@@ -3834,7 +3911,7 @@
           <a:buFontTx/>
           <a:buNone/>
           <a:tabLst/>
-          <a:defRPr b="0" baseline="0" cap="none" i="0" spc="0" strike="noStrike" sz="1800" u="none" kumimoji="0" normalizeH="0">
+          <a:defRPr kumimoji="0" sz="1800" b="0" i="0" u="none" strike="noStrike" cap="none" spc="0" normalizeH="0" baseline="0">
             <a:ln>
               <a:noFill/>
             </a:ln>
@@ -3860,7 +3937,7 @@
           <a:buFontTx/>
           <a:buNone/>
           <a:tabLst/>
-          <a:defRPr b="0" baseline="0" cap="none" i="0" spc="0" strike="noStrike" sz="1800" u="none" kumimoji="0" normalizeH="0">
+          <a:defRPr kumimoji="0" sz="1800" b="0" i="0" u="none" strike="noStrike" cap="none" spc="0" normalizeH="0" baseline="0">
             <a:ln>
               <a:noFill/>
             </a:ln>
@@ -3873,9 +3950,15 @@
         </a:lvl9pPr>
       </a:lstStyle>
       <a:style>
-        <a:lnRef idx="0"/>
-        <a:fillRef idx="0"/>
-        <a:effectRef idx="0"/>
+        <a:lnRef idx="0">
+          <a:scrgbClr r="0" g="0" b="0"/>
+        </a:lnRef>
+        <a:fillRef idx="0">
+          <a:scrgbClr r="0" g="0" b="0"/>
+        </a:fillRef>
+        <a:effectRef idx="0">
+          <a:scrgbClr r="0" g="0" b="0"/>
+        </a:effectRef>
         <a:fontRef idx="none"/>
       </a:style>
     </a:spDef>
@@ -3891,7 +3974,7 @@
         </a:ln>
         <a:effectLst/>
       </a:spPr>
-      <a:bodyPr rot="0" spcFirstLastPara="1" vertOverflow="overflow" horzOverflow="overflow" vert="horz" wrap="square" lIns="91439" tIns="45719" rIns="91439" bIns="45719" numCol="1" spcCol="38100" rtlCol="0" anchor="t" upright="0">
+      <a:bodyPr rot="0" spcFirstLastPara="1" vertOverflow="overflow" horzOverflow="overflow" vert="horz" wrap="square" lIns="91439" tIns="45719" rIns="91439" bIns="45719" numCol="1" spcCol="38100" rtlCol="0" anchor="t">
         <a:noAutofit/>
       </a:bodyPr>
       <a:lstStyle>
@@ -3910,7 +3993,7 @@
           <a:buFontTx/>
           <a:buNone/>
           <a:tabLst/>
-          <a:defRPr b="0" baseline="0" cap="none" i="0" spc="0" strike="noStrike" sz="1800" u="none" kumimoji="0" normalizeH="0">
+          <a:defRPr kumimoji="0" sz="1800" b="0" i="0" u="none" strike="noStrike" cap="none" spc="0" normalizeH="0" baseline="0">
             <a:ln>
               <a:noFill/>
             </a:ln>
@@ -3936,7 +4019,7 @@
           <a:buFontTx/>
           <a:buNone/>
           <a:tabLst/>
-          <a:defRPr b="0" baseline="0" cap="none" i="0" spc="0" strike="noStrike" sz="1800" u="none" kumimoji="0" normalizeH="0">
+          <a:defRPr kumimoji="0" sz="1800" b="0" i="0" u="none" strike="noStrike" cap="none" spc="0" normalizeH="0" baseline="0">
             <a:ln>
               <a:noFill/>
             </a:ln>
@@ -3962,7 +4045,7 @@
           <a:buFontTx/>
           <a:buNone/>
           <a:tabLst/>
-          <a:defRPr b="0" baseline="0" cap="none" i="0" spc="0" strike="noStrike" sz="1800" u="none" kumimoji="0" normalizeH="0">
+          <a:defRPr kumimoji="0" sz="1800" b="0" i="0" u="none" strike="noStrike" cap="none" spc="0" normalizeH="0" baseline="0">
             <a:ln>
               <a:noFill/>
             </a:ln>
@@ -3988,7 +4071,7 @@
           <a:buFontTx/>
           <a:buNone/>
           <a:tabLst/>
-          <a:defRPr b="0" baseline="0" cap="none" i="0" spc="0" strike="noStrike" sz="1800" u="none" kumimoji="0" normalizeH="0">
+          <a:defRPr kumimoji="0" sz="1800" b="0" i="0" u="none" strike="noStrike" cap="none" spc="0" normalizeH="0" baseline="0">
             <a:ln>
               <a:noFill/>
             </a:ln>
@@ -4014,7 +4097,7 @@
           <a:buFontTx/>
           <a:buNone/>
           <a:tabLst/>
-          <a:defRPr b="0" baseline="0" cap="none" i="0" spc="0" strike="noStrike" sz="1800" u="none" kumimoji="0" normalizeH="0">
+          <a:defRPr kumimoji="0" sz="1800" b="0" i="0" u="none" strike="noStrike" cap="none" spc="0" normalizeH="0" baseline="0">
             <a:ln>
               <a:noFill/>
             </a:ln>
@@ -4040,7 +4123,7 @@
           <a:buFontTx/>
           <a:buNone/>
           <a:tabLst/>
-          <a:defRPr b="0" baseline="0" cap="none" i="0" spc="0" strike="noStrike" sz="1800" u="none" kumimoji="0" normalizeH="0">
+          <a:defRPr kumimoji="0" sz="1800" b="0" i="0" u="none" strike="noStrike" cap="none" spc="0" normalizeH="0" baseline="0">
             <a:ln>
               <a:noFill/>
             </a:ln>
@@ -4066,7 +4149,7 @@
           <a:buFontTx/>
           <a:buNone/>
           <a:tabLst/>
-          <a:defRPr b="0" baseline="0" cap="none" i="0" spc="0" strike="noStrike" sz="1800" u="none" kumimoji="0" normalizeH="0">
+          <a:defRPr kumimoji="0" sz="1800" b="0" i="0" u="none" strike="noStrike" cap="none" spc="0" normalizeH="0" baseline="0">
             <a:ln>
               <a:noFill/>
             </a:ln>
@@ -4092,7 +4175,7 @@
           <a:buFontTx/>
           <a:buNone/>
           <a:tabLst/>
-          <a:defRPr b="0" baseline="0" cap="none" i="0" spc="0" strike="noStrike" sz="1800" u="none" kumimoji="0" normalizeH="0">
+          <a:defRPr kumimoji="0" sz="1800" b="0" i="0" u="none" strike="noStrike" cap="none" spc="0" normalizeH="0" baseline="0">
             <a:ln>
               <a:noFill/>
             </a:ln>
@@ -4118,7 +4201,7 @@
           <a:buFontTx/>
           <a:buNone/>
           <a:tabLst/>
-          <a:defRPr b="0" baseline="0" cap="none" i="0" spc="0" strike="noStrike" sz="1800" u="none" kumimoji="0" normalizeH="0">
+          <a:defRPr kumimoji="0" sz="1800" b="0" i="0" u="none" strike="noStrike" cap="none" spc="0" normalizeH="0" baseline="0">
             <a:ln>
               <a:noFill/>
             </a:ln>
@@ -4144,7 +4227,7 @@
           <a:buFontTx/>
           <a:buNone/>
           <a:tabLst/>
-          <a:defRPr b="0" baseline="0" cap="none" i="0" spc="0" strike="noStrike" sz="1800" u="none" kumimoji="0" normalizeH="0">
+          <a:defRPr kumimoji="0" sz="1800" b="0" i="0" u="none" strike="noStrike" cap="none" spc="0" normalizeH="0" baseline="0">
             <a:ln>
               <a:noFill/>
             </a:ln>
@@ -4157,9 +4240,15 @@
         </a:lvl9pPr>
       </a:lstStyle>
       <a:style>
-        <a:lnRef idx="0"/>
-        <a:fillRef idx="0"/>
-        <a:effectRef idx="0"/>
+        <a:lnRef idx="0">
+          <a:scrgbClr r="0" g="0" b="0"/>
+        </a:lnRef>
+        <a:fillRef idx="0">
+          <a:scrgbClr r="0" g="0" b="0"/>
+        </a:fillRef>
+        <a:effectRef idx="0">
+          <a:scrgbClr r="0" g="0" b="0"/>
+        </a:effectRef>
         <a:fontRef idx="none"/>
       </a:style>
     </a:lnDef>
@@ -4172,7 +4261,7 @@
         </a:ln>
         <a:effectLst/>
       </a:spPr>
-      <a:bodyPr rot="0" spcFirstLastPara="1" vertOverflow="overflow" horzOverflow="overflow" vert="horz" wrap="square" lIns="50800" tIns="50800" rIns="50800" bIns="50800" numCol="1" spcCol="38100" rtlCol="0" anchor="ctr" upright="0">
+      <a:bodyPr rot="0" spcFirstLastPara="1" vertOverflow="overflow" horzOverflow="overflow" vert="horz" wrap="square" lIns="50800" tIns="50800" rIns="50800" bIns="50800" numCol="1" spcCol="38100" rtlCol="0" anchor="ctr">
         <a:spAutoFit/>
       </a:bodyPr>
       <a:lstStyle>
@@ -4191,7 +4280,7 @@
           <a:buFontTx/>
           <a:buNone/>
           <a:tabLst/>
-          <a:defRPr b="0" baseline="0" cap="none" i="0" spc="0" strike="noStrike" sz="3600" u="none" kumimoji="0" normalizeH="0">
+          <a:defRPr kumimoji="0" sz="3600" b="0" i="0" u="none" strike="noStrike" cap="none" spc="0" normalizeH="0" baseline="0">
             <a:ln>
               <a:noFill/>
             </a:ln>
@@ -4221,7 +4310,7 @@
           <a:buFontTx/>
           <a:buNone/>
           <a:tabLst/>
-          <a:defRPr b="0" baseline="0" cap="none" i="0" spc="0" strike="noStrike" sz="1800" u="none" kumimoji="0" normalizeH="0">
+          <a:defRPr kumimoji="0" sz="1800" b="0" i="0" u="none" strike="noStrike" cap="none" spc="0" normalizeH="0" baseline="0">
             <a:ln>
               <a:noFill/>
             </a:ln>
@@ -4247,7 +4336,7 @@
           <a:buFontTx/>
           <a:buNone/>
           <a:tabLst/>
-          <a:defRPr b="0" baseline="0" cap="none" i="0" spc="0" strike="noStrike" sz="1800" u="none" kumimoji="0" normalizeH="0">
+          <a:defRPr kumimoji="0" sz="1800" b="0" i="0" u="none" strike="noStrike" cap="none" spc="0" normalizeH="0" baseline="0">
             <a:ln>
               <a:noFill/>
             </a:ln>
@@ -4273,7 +4362,7 @@
           <a:buFontTx/>
           <a:buNone/>
           <a:tabLst/>
-          <a:defRPr b="0" baseline="0" cap="none" i="0" spc="0" strike="noStrike" sz="1800" u="none" kumimoji="0" normalizeH="0">
+          <a:defRPr kumimoji="0" sz="1800" b="0" i="0" u="none" strike="noStrike" cap="none" spc="0" normalizeH="0" baseline="0">
             <a:ln>
               <a:noFill/>
             </a:ln>
@@ -4299,7 +4388,7 @@
           <a:buFontTx/>
           <a:buNone/>
           <a:tabLst/>
-          <a:defRPr b="0" baseline="0" cap="none" i="0" spc="0" strike="noStrike" sz="1800" u="none" kumimoji="0" normalizeH="0">
+          <a:defRPr kumimoji="0" sz="1800" b="0" i="0" u="none" strike="noStrike" cap="none" spc="0" normalizeH="0" baseline="0">
             <a:ln>
               <a:noFill/>
             </a:ln>
@@ -4325,7 +4414,7 @@
           <a:buFontTx/>
           <a:buNone/>
           <a:tabLst/>
-          <a:defRPr b="0" baseline="0" cap="none" i="0" spc="0" strike="noStrike" sz="1800" u="none" kumimoji="0" normalizeH="0">
+          <a:defRPr kumimoji="0" sz="1800" b="0" i="0" u="none" strike="noStrike" cap="none" spc="0" normalizeH="0" baseline="0">
             <a:ln>
               <a:noFill/>
             </a:ln>
@@ -4351,7 +4440,7 @@
           <a:buFontTx/>
           <a:buNone/>
           <a:tabLst/>
-          <a:defRPr b="0" baseline="0" cap="none" i="0" spc="0" strike="noStrike" sz="1800" u="none" kumimoji="0" normalizeH="0">
+          <a:defRPr kumimoji="0" sz="1800" b="0" i="0" u="none" strike="noStrike" cap="none" spc="0" normalizeH="0" baseline="0">
             <a:ln>
               <a:noFill/>
             </a:ln>
@@ -4377,7 +4466,7 @@
           <a:buFontTx/>
           <a:buNone/>
           <a:tabLst/>
-          <a:defRPr b="0" baseline="0" cap="none" i="0" spc="0" strike="noStrike" sz="1800" u="none" kumimoji="0" normalizeH="0">
+          <a:defRPr kumimoji="0" sz="1800" b="0" i="0" u="none" strike="noStrike" cap="none" spc="0" normalizeH="0" baseline="0">
             <a:ln>
               <a:noFill/>
             </a:ln>
@@ -4403,7 +4492,7 @@
           <a:buFontTx/>
           <a:buNone/>
           <a:tabLst/>
-          <a:defRPr b="0" baseline="0" cap="none" i="0" spc="0" strike="noStrike" sz="1800" u="none" kumimoji="0" normalizeH="0">
+          <a:defRPr kumimoji="0" sz="1800" b="0" i="0" u="none" strike="noStrike" cap="none" spc="0" normalizeH="0" baseline="0">
             <a:ln>
               <a:noFill/>
             </a:ln>
@@ -4429,7 +4518,7 @@
           <a:buFontTx/>
           <a:buNone/>
           <a:tabLst/>
-          <a:defRPr b="0" baseline="0" cap="none" i="0" spc="0" strike="noStrike" sz="1800" u="none" kumimoji="0" normalizeH="0">
+          <a:defRPr kumimoji="0" sz="1800" b="0" i="0" u="none" strike="noStrike" cap="none" spc="0" normalizeH="0" baseline="0">
             <a:ln>
               <a:noFill/>
             </a:ln>
@@ -4442,12 +4531,19 @@
         </a:lvl9pPr>
       </a:lstStyle>
       <a:style>
-        <a:lnRef idx="0"/>
-        <a:fillRef idx="0"/>
-        <a:effectRef idx="0"/>
+        <a:lnRef idx="0">
+          <a:scrgbClr r="0" g="0" b="0"/>
+        </a:lnRef>
+        <a:fillRef idx="0">
+          <a:scrgbClr r="0" g="0" b="0"/>
+        </a:fillRef>
+        <a:effectRef idx="0">
+          <a:scrgbClr r="0" g="0" b="0"/>
+        </a:effectRef>
         <a:fontRef idx="none"/>
       </a:style>
     </a:txDef>
   </a:objectDefaults>
+  <a:extraClrSchemeLst/>
 </a:theme>
 </file>
</xml_diff>